<commit_message>
Animations and Design changes made
</commit_message>
<xml_diff>
--- a/TEAM PINCUSHION FLOWER ANNUAL.pptx
+++ b/TEAM PINCUSHION FLOWER ANNUAL.pptx
@@ -6103,9 +6103,256 @@
   <p:timing>
     <p:tnLst>
       <p:par>
-        <p:cTn id="1" dur="indefinite" restart="never" nodeType="tmRoot"/>
+        <p:cTn id="1" dur="indefinite" restart="never" nodeType="tmRoot">
+          <p:childTnLst>
+            <p:seq concurrent="1" nextAc="seek">
+              <p:cTn id="2" dur="indefinite" nodeType="mainSeq">
+                <p:childTnLst>
+                  <p:par>
+                    <p:cTn id="3" fill="hold">
+                      <p:stCondLst>
+                        <p:cond delay="indefinite"/>
+                      </p:stCondLst>
+                      <p:childTnLst>
+                        <p:par>
+                          <p:cTn id="4" fill="hold">
+                            <p:stCondLst>
+                              <p:cond delay="0"/>
+                            </p:stCondLst>
+                            <p:childTnLst>
+                              <p:par>
+                                <p:cTn id="5" presetID="10" presetClass="entr" presetSubtype="0" fill="hold" nodeType="clickEffect">
+                                  <p:stCondLst>
+                                    <p:cond delay="0"/>
+                                  </p:stCondLst>
+                                  <p:childTnLst>
+                                    <p:set>
+                                      <p:cBhvr>
+                                        <p:cTn id="6" dur="1" fill="hold">
+                                          <p:stCondLst>
+                                            <p:cond delay="0"/>
+                                          </p:stCondLst>
+                                        </p:cTn>
+                                        <p:tgtEl>
+                                          <p:spTgt spid="1026"/>
+                                        </p:tgtEl>
+                                        <p:attrNameLst>
+                                          <p:attrName>style.visibility</p:attrName>
+                                        </p:attrNameLst>
+                                      </p:cBhvr>
+                                      <p:to>
+                                        <p:strVal val="visible"/>
+                                      </p:to>
+                                    </p:set>
+                                    <p:animEffect transition="in" filter="fade">
+                                      <p:cBhvr>
+                                        <p:cTn id="7" dur="2000"/>
+                                        <p:tgtEl>
+                                          <p:spTgt spid="1026"/>
+                                        </p:tgtEl>
+                                      </p:cBhvr>
+                                    </p:animEffect>
+                                  </p:childTnLst>
+                                </p:cTn>
+                              </p:par>
+                            </p:childTnLst>
+                          </p:cTn>
+                        </p:par>
+                      </p:childTnLst>
+                    </p:cTn>
+                  </p:par>
+                  <p:par>
+                    <p:cTn id="8" fill="hold">
+                      <p:stCondLst>
+                        <p:cond delay="indefinite"/>
+                      </p:stCondLst>
+                      <p:childTnLst>
+                        <p:par>
+                          <p:cTn id="9" fill="hold">
+                            <p:stCondLst>
+                              <p:cond delay="0"/>
+                            </p:stCondLst>
+                            <p:childTnLst>
+                              <p:par>
+                                <p:cTn id="10" presetID="10" presetClass="entr" presetSubtype="0" fill="hold" nodeType="clickEffect">
+                                  <p:stCondLst>
+                                    <p:cond delay="0"/>
+                                  </p:stCondLst>
+                                  <p:childTnLst>
+                                    <p:set>
+                                      <p:cBhvr>
+                                        <p:cTn id="11" dur="1" fill="hold">
+                                          <p:stCondLst>
+                                            <p:cond delay="0"/>
+                                          </p:stCondLst>
+                                        </p:cTn>
+                                        <p:tgtEl>
+                                          <p:spTgt spid="4"/>
+                                        </p:tgtEl>
+                                        <p:attrNameLst>
+                                          <p:attrName>style.visibility</p:attrName>
+                                        </p:attrNameLst>
+                                      </p:cBhvr>
+                                      <p:to>
+                                        <p:strVal val="visible"/>
+                                      </p:to>
+                                    </p:set>
+                                    <p:animEffect transition="in" filter="fade">
+                                      <p:cBhvr>
+                                        <p:cTn id="12" dur="2000"/>
+                                        <p:tgtEl>
+                                          <p:spTgt spid="4"/>
+                                        </p:tgtEl>
+                                      </p:cBhvr>
+                                    </p:animEffect>
+                                  </p:childTnLst>
+                                </p:cTn>
+                              </p:par>
+                            </p:childTnLst>
+                          </p:cTn>
+                        </p:par>
+                      </p:childTnLst>
+                    </p:cTn>
+                  </p:par>
+                  <p:par>
+                    <p:cTn id="13" fill="hold">
+                      <p:stCondLst>
+                        <p:cond delay="indefinite"/>
+                      </p:stCondLst>
+                      <p:childTnLst>
+                        <p:par>
+                          <p:cTn id="14" fill="hold">
+                            <p:stCondLst>
+                              <p:cond delay="0"/>
+                            </p:stCondLst>
+                            <p:childTnLst>
+                              <p:par>
+                                <p:cTn id="15" presetID="22" presetClass="entr" presetSubtype="4" fill="hold" grpId="0" nodeType="clickEffect">
+                                  <p:stCondLst>
+                                    <p:cond delay="0"/>
+                                  </p:stCondLst>
+                                  <p:childTnLst>
+                                    <p:set>
+                                      <p:cBhvr>
+                                        <p:cTn id="16" dur="1" fill="hold">
+                                          <p:stCondLst>
+                                            <p:cond delay="0"/>
+                                          </p:stCondLst>
+                                        </p:cTn>
+                                        <p:tgtEl>
+                                          <p:spTgt spid="2"/>
+                                        </p:tgtEl>
+                                        <p:attrNameLst>
+                                          <p:attrName>style.visibility</p:attrName>
+                                        </p:attrNameLst>
+                                      </p:cBhvr>
+                                      <p:to>
+                                        <p:strVal val="visible"/>
+                                      </p:to>
+                                    </p:set>
+                                    <p:animEffect transition="in" filter="wipe(down)">
+                                      <p:cBhvr>
+                                        <p:cTn id="17" dur="500"/>
+                                        <p:tgtEl>
+                                          <p:spTgt spid="2"/>
+                                        </p:tgtEl>
+                                      </p:cBhvr>
+                                    </p:animEffect>
+                                  </p:childTnLst>
+                                </p:cTn>
+                              </p:par>
+                            </p:childTnLst>
+                          </p:cTn>
+                        </p:par>
+                      </p:childTnLst>
+                    </p:cTn>
+                  </p:par>
+                  <p:par>
+                    <p:cTn id="18" fill="hold">
+                      <p:stCondLst>
+                        <p:cond delay="indefinite"/>
+                      </p:stCondLst>
+                      <p:childTnLst>
+                        <p:par>
+                          <p:cTn id="19" fill="hold">
+                            <p:stCondLst>
+                              <p:cond delay="0"/>
+                            </p:stCondLst>
+                            <p:childTnLst>
+                              <p:par>
+                                <p:cTn id="20" presetID="10" presetClass="entr" presetSubtype="0" fill="hold" grpId="0" nodeType="clickEffect">
+                                  <p:stCondLst>
+                                    <p:cond delay="0"/>
+                                  </p:stCondLst>
+                                  <p:childTnLst>
+                                    <p:set>
+                                      <p:cBhvr>
+                                        <p:cTn id="21" dur="1" fill="hold">
+                                          <p:stCondLst>
+                                            <p:cond delay="0"/>
+                                          </p:stCondLst>
+                                        </p:cTn>
+                                        <p:tgtEl>
+                                          <p:spTgt spid="3">
+                                            <p:txEl>
+                                              <p:pRg st="0" end="0"/>
+                                            </p:txEl>
+                                          </p:spTgt>
+                                        </p:tgtEl>
+                                        <p:attrNameLst>
+                                          <p:attrName>style.visibility</p:attrName>
+                                        </p:attrNameLst>
+                                      </p:cBhvr>
+                                      <p:to>
+                                        <p:strVal val="visible"/>
+                                      </p:to>
+                                    </p:set>
+                                    <p:animEffect transition="in" filter="fade">
+                                      <p:cBhvr>
+                                        <p:cTn id="22" dur="2000"/>
+                                        <p:tgtEl>
+                                          <p:spTgt spid="3">
+                                            <p:txEl>
+                                              <p:pRg st="0" end="0"/>
+                                            </p:txEl>
+                                          </p:spTgt>
+                                        </p:tgtEl>
+                                      </p:cBhvr>
+                                    </p:animEffect>
+                                  </p:childTnLst>
+                                </p:cTn>
+                              </p:par>
+                            </p:childTnLst>
+                          </p:cTn>
+                        </p:par>
+                      </p:childTnLst>
+                    </p:cTn>
+                  </p:par>
+                </p:childTnLst>
+              </p:cTn>
+              <p:prevCondLst>
+                <p:cond evt="onPrev" delay="0">
+                  <p:tgtEl>
+                    <p:sldTgt/>
+                  </p:tgtEl>
+                </p:cond>
+              </p:prevCondLst>
+              <p:nextCondLst>
+                <p:cond evt="onNext" delay="0">
+                  <p:tgtEl>
+                    <p:sldTgt/>
+                  </p:tgtEl>
+                </p:cond>
+              </p:nextCondLst>
+            </p:seq>
+          </p:childTnLst>
+        </p:cTn>
       </p:par>
     </p:tnLst>
+    <p:bldLst>
+      <p:bldP spid="2" grpId="0"/>
+      <p:bldP spid="3" grpId="0" build="allAtOnce"/>
+    </p:bldLst>
   </p:timing>
 </p:sld>
 </file>
@@ -6825,7 +7072,7 @@
         </p:nvSpPr>
         <p:spPr>
           <a:xfrm>
-            <a:off x="8276823" y="1663108"/>
+            <a:off x="8276823" y="1689234"/>
             <a:ext cx="3915177" cy="4100658"/>
           </a:xfrm>
           <a:prstGeom prst="rect">
@@ -7146,9 +7393,979 @@
   <p:timing>
     <p:tnLst>
       <p:par>
-        <p:cTn id="1" dur="indefinite" restart="never" nodeType="tmRoot"/>
+        <p:cTn id="1" dur="indefinite" restart="never" nodeType="tmRoot">
+          <p:childTnLst>
+            <p:seq concurrent="1" nextAc="seek">
+              <p:cTn id="2" dur="indefinite" nodeType="mainSeq">
+                <p:childTnLst>
+                  <p:par>
+                    <p:cTn id="3" fill="hold">
+                      <p:stCondLst>
+                        <p:cond delay="indefinite"/>
+                      </p:stCondLst>
+                      <p:childTnLst>
+                        <p:par>
+                          <p:cTn id="4" fill="hold">
+                            <p:stCondLst>
+                              <p:cond delay="0"/>
+                            </p:stCondLst>
+                            <p:childTnLst>
+                              <p:par>
+                                <p:cTn id="5" presetID="22" presetClass="entr" presetSubtype="4" fill="hold" grpId="0" nodeType="clickEffect">
+                                  <p:stCondLst>
+                                    <p:cond delay="0"/>
+                                  </p:stCondLst>
+                                  <p:childTnLst>
+                                    <p:set>
+                                      <p:cBhvr>
+                                        <p:cTn id="6" dur="1" fill="hold">
+                                          <p:stCondLst>
+                                            <p:cond delay="0"/>
+                                          </p:stCondLst>
+                                        </p:cTn>
+                                        <p:tgtEl>
+                                          <p:spTgt spid="8">
+                                            <p:txEl>
+                                              <p:pRg st="1" end="1"/>
+                                            </p:txEl>
+                                          </p:spTgt>
+                                        </p:tgtEl>
+                                        <p:attrNameLst>
+                                          <p:attrName>style.visibility</p:attrName>
+                                        </p:attrNameLst>
+                                      </p:cBhvr>
+                                      <p:to>
+                                        <p:strVal val="visible"/>
+                                      </p:to>
+                                    </p:set>
+                                    <p:animEffect transition="in" filter="wipe(down)">
+                                      <p:cBhvr>
+                                        <p:cTn id="7" dur="500"/>
+                                        <p:tgtEl>
+                                          <p:spTgt spid="8">
+                                            <p:txEl>
+                                              <p:pRg st="1" end="1"/>
+                                            </p:txEl>
+                                          </p:spTgt>
+                                        </p:tgtEl>
+                                      </p:cBhvr>
+                                    </p:animEffect>
+                                  </p:childTnLst>
+                                </p:cTn>
+                              </p:par>
+                              <p:par>
+                                <p:cTn id="8" presetID="22" presetClass="entr" presetSubtype="4" fill="hold" grpId="0" nodeType="withEffect">
+                                  <p:stCondLst>
+                                    <p:cond delay="0"/>
+                                  </p:stCondLst>
+                                  <p:childTnLst>
+                                    <p:set>
+                                      <p:cBhvr>
+                                        <p:cTn id="9" dur="1" fill="hold">
+                                          <p:stCondLst>
+                                            <p:cond delay="0"/>
+                                          </p:stCondLst>
+                                        </p:cTn>
+                                        <p:tgtEl>
+                                          <p:spTgt spid="8">
+                                            <p:txEl>
+                                              <p:pRg st="2" end="2"/>
+                                            </p:txEl>
+                                          </p:spTgt>
+                                        </p:tgtEl>
+                                        <p:attrNameLst>
+                                          <p:attrName>style.visibility</p:attrName>
+                                        </p:attrNameLst>
+                                      </p:cBhvr>
+                                      <p:to>
+                                        <p:strVal val="visible"/>
+                                      </p:to>
+                                    </p:set>
+                                    <p:animEffect transition="in" filter="wipe(down)">
+                                      <p:cBhvr>
+                                        <p:cTn id="10" dur="500"/>
+                                        <p:tgtEl>
+                                          <p:spTgt spid="8">
+                                            <p:txEl>
+                                              <p:pRg st="2" end="2"/>
+                                            </p:txEl>
+                                          </p:spTgt>
+                                        </p:tgtEl>
+                                      </p:cBhvr>
+                                    </p:animEffect>
+                                  </p:childTnLst>
+                                </p:cTn>
+                              </p:par>
+                            </p:childTnLst>
+                          </p:cTn>
+                        </p:par>
+                      </p:childTnLst>
+                    </p:cTn>
+                  </p:par>
+                  <p:par>
+                    <p:cTn id="11" fill="hold">
+                      <p:stCondLst>
+                        <p:cond delay="indefinite"/>
+                      </p:stCondLst>
+                      <p:childTnLst>
+                        <p:par>
+                          <p:cTn id="12" fill="hold">
+                            <p:stCondLst>
+                              <p:cond delay="0"/>
+                            </p:stCondLst>
+                            <p:childTnLst>
+                              <p:par>
+                                <p:cTn id="13" presetID="22" presetClass="entr" presetSubtype="4" fill="hold" grpId="0" nodeType="clickEffect">
+                                  <p:stCondLst>
+                                    <p:cond delay="0"/>
+                                  </p:stCondLst>
+                                  <p:childTnLst>
+                                    <p:set>
+                                      <p:cBhvr>
+                                        <p:cTn id="14" dur="1" fill="hold">
+                                          <p:stCondLst>
+                                            <p:cond delay="0"/>
+                                          </p:stCondLst>
+                                        </p:cTn>
+                                        <p:tgtEl>
+                                          <p:spTgt spid="8">
+                                            <p:txEl>
+                                              <p:pRg st="4" end="4"/>
+                                            </p:txEl>
+                                          </p:spTgt>
+                                        </p:tgtEl>
+                                        <p:attrNameLst>
+                                          <p:attrName>style.visibility</p:attrName>
+                                        </p:attrNameLst>
+                                      </p:cBhvr>
+                                      <p:to>
+                                        <p:strVal val="visible"/>
+                                      </p:to>
+                                    </p:set>
+                                    <p:animEffect transition="in" filter="wipe(down)">
+                                      <p:cBhvr>
+                                        <p:cTn id="15" dur="500"/>
+                                        <p:tgtEl>
+                                          <p:spTgt spid="8">
+                                            <p:txEl>
+                                              <p:pRg st="4" end="4"/>
+                                            </p:txEl>
+                                          </p:spTgt>
+                                        </p:tgtEl>
+                                      </p:cBhvr>
+                                    </p:animEffect>
+                                  </p:childTnLst>
+                                </p:cTn>
+                              </p:par>
+                              <p:par>
+                                <p:cTn id="16" presetID="22" presetClass="entr" presetSubtype="4" fill="hold" grpId="0" nodeType="withEffect">
+                                  <p:stCondLst>
+                                    <p:cond delay="0"/>
+                                  </p:stCondLst>
+                                  <p:childTnLst>
+                                    <p:set>
+                                      <p:cBhvr>
+                                        <p:cTn id="17" dur="1" fill="hold">
+                                          <p:stCondLst>
+                                            <p:cond delay="0"/>
+                                          </p:stCondLst>
+                                        </p:cTn>
+                                        <p:tgtEl>
+                                          <p:spTgt spid="8">
+                                            <p:txEl>
+                                              <p:pRg st="5" end="5"/>
+                                            </p:txEl>
+                                          </p:spTgt>
+                                        </p:tgtEl>
+                                        <p:attrNameLst>
+                                          <p:attrName>style.visibility</p:attrName>
+                                        </p:attrNameLst>
+                                      </p:cBhvr>
+                                      <p:to>
+                                        <p:strVal val="visible"/>
+                                      </p:to>
+                                    </p:set>
+                                    <p:animEffect transition="in" filter="wipe(down)">
+                                      <p:cBhvr>
+                                        <p:cTn id="18" dur="500"/>
+                                        <p:tgtEl>
+                                          <p:spTgt spid="8">
+                                            <p:txEl>
+                                              <p:pRg st="5" end="5"/>
+                                            </p:txEl>
+                                          </p:spTgt>
+                                        </p:tgtEl>
+                                      </p:cBhvr>
+                                    </p:animEffect>
+                                  </p:childTnLst>
+                                </p:cTn>
+                              </p:par>
+                            </p:childTnLst>
+                          </p:cTn>
+                        </p:par>
+                      </p:childTnLst>
+                    </p:cTn>
+                  </p:par>
+                  <p:par>
+                    <p:cTn id="19" fill="hold">
+                      <p:stCondLst>
+                        <p:cond delay="indefinite"/>
+                      </p:stCondLst>
+                      <p:childTnLst>
+                        <p:par>
+                          <p:cTn id="20" fill="hold">
+                            <p:stCondLst>
+                              <p:cond delay="0"/>
+                            </p:stCondLst>
+                            <p:childTnLst>
+                              <p:par>
+                                <p:cTn id="21" presetID="2" presetClass="entr" presetSubtype="4" fill="hold" grpId="0" nodeType="clickEffect">
+                                  <p:stCondLst>
+                                    <p:cond delay="0"/>
+                                  </p:stCondLst>
+                                  <p:childTnLst>
+                                    <p:set>
+                                      <p:cBhvr>
+                                        <p:cTn id="22" dur="1" fill="hold">
+                                          <p:stCondLst>
+                                            <p:cond delay="0"/>
+                                          </p:stCondLst>
+                                        </p:cTn>
+                                        <p:tgtEl>
+                                          <p:spTgt spid="7">
+                                            <p:txEl>
+                                              <p:pRg st="1" end="1"/>
+                                            </p:txEl>
+                                          </p:spTgt>
+                                        </p:tgtEl>
+                                        <p:attrNameLst>
+                                          <p:attrName>style.visibility</p:attrName>
+                                        </p:attrNameLst>
+                                      </p:cBhvr>
+                                      <p:to>
+                                        <p:strVal val="visible"/>
+                                      </p:to>
+                                    </p:set>
+                                    <p:anim calcmode="lin" valueType="num">
+                                      <p:cBhvr additive="base">
+                                        <p:cTn id="23" dur="500" fill="hold"/>
+                                        <p:tgtEl>
+                                          <p:spTgt spid="7">
+                                            <p:txEl>
+                                              <p:pRg st="1" end="1"/>
+                                            </p:txEl>
+                                          </p:spTgt>
+                                        </p:tgtEl>
+                                        <p:attrNameLst>
+                                          <p:attrName>ppt_x</p:attrName>
+                                        </p:attrNameLst>
+                                      </p:cBhvr>
+                                      <p:tavLst>
+                                        <p:tav tm="0">
+                                          <p:val>
+                                            <p:strVal val="#ppt_x"/>
+                                          </p:val>
+                                        </p:tav>
+                                        <p:tav tm="100000">
+                                          <p:val>
+                                            <p:strVal val="#ppt_x"/>
+                                          </p:val>
+                                        </p:tav>
+                                      </p:tavLst>
+                                    </p:anim>
+                                    <p:anim calcmode="lin" valueType="num">
+                                      <p:cBhvr additive="base">
+                                        <p:cTn id="24" dur="500" fill="hold"/>
+                                        <p:tgtEl>
+                                          <p:spTgt spid="7">
+                                            <p:txEl>
+                                              <p:pRg st="1" end="1"/>
+                                            </p:txEl>
+                                          </p:spTgt>
+                                        </p:tgtEl>
+                                        <p:attrNameLst>
+                                          <p:attrName>ppt_y</p:attrName>
+                                        </p:attrNameLst>
+                                      </p:cBhvr>
+                                      <p:tavLst>
+                                        <p:tav tm="0">
+                                          <p:val>
+                                            <p:strVal val="1+#ppt_h/2"/>
+                                          </p:val>
+                                        </p:tav>
+                                        <p:tav tm="100000">
+                                          <p:val>
+                                            <p:strVal val="#ppt_y"/>
+                                          </p:val>
+                                        </p:tav>
+                                      </p:tavLst>
+                                    </p:anim>
+                                  </p:childTnLst>
+                                </p:cTn>
+                              </p:par>
+                              <p:par>
+                                <p:cTn id="25" presetID="2" presetClass="entr" presetSubtype="4" fill="hold" grpId="0" nodeType="withEffect">
+                                  <p:stCondLst>
+                                    <p:cond delay="0"/>
+                                  </p:stCondLst>
+                                  <p:childTnLst>
+                                    <p:set>
+                                      <p:cBhvr>
+                                        <p:cTn id="26" dur="1" fill="hold">
+                                          <p:stCondLst>
+                                            <p:cond delay="0"/>
+                                          </p:stCondLst>
+                                        </p:cTn>
+                                        <p:tgtEl>
+                                          <p:spTgt spid="7">
+                                            <p:txEl>
+                                              <p:pRg st="2" end="2"/>
+                                            </p:txEl>
+                                          </p:spTgt>
+                                        </p:tgtEl>
+                                        <p:attrNameLst>
+                                          <p:attrName>style.visibility</p:attrName>
+                                        </p:attrNameLst>
+                                      </p:cBhvr>
+                                      <p:to>
+                                        <p:strVal val="visible"/>
+                                      </p:to>
+                                    </p:set>
+                                    <p:anim calcmode="lin" valueType="num">
+                                      <p:cBhvr additive="base">
+                                        <p:cTn id="27" dur="500" fill="hold"/>
+                                        <p:tgtEl>
+                                          <p:spTgt spid="7">
+                                            <p:txEl>
+                                              <p:pRg st="2" end="2"/>
+                                            </p:txEl>
+                                          </p:spTgt>
+                                        </p:tgtEl>
+                                        <p:attrNameLst>
+                                          <p:attrName>ppt_x</p:attrName>
+                                        </p:attrNameLst>
+                                      </p:cBhvr>
+                                      <p:tavLst>
+                                        <p:tav tm="0">
+                                          <p:val>
+                                            <p:strVal val="#ppt_x"/>
+                                          </p:val>
+                                        </p:tav>
+                                        <p:tav tm="100000">
+                                          <p:val>
+                                            <p:strVal val="#ppt_x"/>
+                                          </p:val>
+                                        </p:tav>
+                                      </p:tavLst>
+                                    </p:anim>
+                                    <p:anim calcmode="lin" valueType="num">
+                                      <p:cBhvr additive="base">
+                                        <p:cTn id="28" dur="500" fill="hold"/>
+                                        <p:tgtEl>
+                                          <p:spTgt spid="7">
+                                            <p:txEl>
+                                              <p:pRg st="2" end="2"/>
+                                            </p:txEl>
+                                          </p:spTgt>
+                                        </p:tgtEl>
+                                        <p:attrNameLst>
+                                          <p:attrName>ppt_y</p:attrName>
+                                        </p:attrNameLst>
+                                      </p:cBhvr>
+                                      <p:tavLst>
+                                        <p:tav tm="0">
+                                          <p:val>
+                                            <p:strVal val="1+#ppt_h/2"/>
+                                          </p:val>
+                                        </p:tav>
+                                        <p:tav tm="100000">
+                                          <p:val>
+                                            <p:strVal val="#ppt_y"/>
+                                          </p:val>
+                                        </p:tav>
+                                      </p:tavLst>
+                                    </p:anim>
+                                  </p:childTnLst>
+                                </p:cTn>
+                              </p:par>
+                            </p:childTnLst>
+                          </p:cTn>
+                        </p:par>
+                      </p:childTnLst>
+                    </p:cTn>
+                  </p:par>
+                  <p:par>
+                    <p:cTn id="29" fill="hold">
+                      <p:stCondLst>
+                        <p:cond delay="indefinite"/>
+                      </p:stCondLst>
+                      <p:childTnLst>
+                        <p:par>
+                          <p:cTn id="30" fill="hold">
+                            <p:stCondLst>
+                              <p:cond delay="0"/>
+                            </p:stCondLst>
+                            <p:childTnLst>
+                              <p:par>
+                                <p:cTn id="31" presetID="2" presetClass="entr" presetSubtype="4" fill="hold" grpId="0" nodeType="clickEffect">
+                                  <p:stCondLst>
+                                    <p:cond delay="0"/>
+                                  </p:stCondLst>
+                                  <p:childTnLst>
+                                    <p:set>
+                                      <p:cBhvr>
+                                        <p:cTn id="32" dur="1" fill="hold">
+                                          <p:stCondLst>
+                                            <p:cond delay="0"/>
+                                          </p:stCondLst>
+                                        </p:cTn>
+                                        <p:tgtEl>
+                                          <p:spTgt spid="7">
+                                            <p:txEl>
+                                              <p:pRg st="4" end="4"/>
+                                            </p:txEl>
+                                          </p:spTgt>
+                                        </p:tgtEl>
+                                        <p:attrNameLst>
+                                          <p:attrName>style.visibility</p:attrName>
+                                        </p:attrNameLst>
+                                      </p:cBhvr>
+                                      <p:to>
+                                        <p:strVal val="visible"/>
+                                      </p:to>
+                                    </p:set>
+                                    <p:anim calcmode="lin" valueType="num">
+                                      <p:cBhvr additive="base">
+                                        <p:cTn id="33" dur="500" fill="hold"/>
+                                        <p:tgtEl>
+                                          <p:spTgt spid="7">
+                                            <p:txEl>
+                                              <p:pRg st="4" end="4"/>
+                                            </p:txEl>
+                                          </p:spTgt>
+                                        </p:tgtEl>
+                                        <p:attrNameLst>
+                                          <p:attrName>ppt_x</p:attrName>
+                                        </p:attrNameLst>
+                                      </p:cBhvr>
+                                      <p:tavLst>
+                                        <p:tav tm="0">
+                                          <p:val>
+                                            <p:strVal val="#ppt_x"/>
+                                          </p:val>
+                                        </p:tav>
+                                        <p:tav tm="100000">
+                                          <p:val>
+                                            <p:strVal val="#ppt_x"/>
+                                          </p:val>
+                                        </p:tav>
+                                      </p:tavLst>
+                                    </p:anim>
+                                    <p:anim calcmode="lin" valueType="num">
+                                      <p:cBhvr additive="base">
+                                        <p:cTn id="34" dur="500" fill="hold"/>
+                                        <p:tgtEl>
+                                          <p:spTgt spid="7">
+                                            <p:txEl>
+                                              <p:pRg st="4" end="4"/>
+                                            </p:txEl>
+                                          </p:spTgt>
+                                        </p:tgtEl>
+                                        <p:attrNameLst>
+                                          <p:attrName>ppt_y</p:attrName>
+                                        </p:attrNameLst>
+                                      </p:cBhvr>
+                                      <p:tavLst>
+                                        <p:tav tm="0">
+                                          <p:val>
+                                            <p:strVal val="1+#ppt_h/2"/>
+                                          </p:val>
+                                        </p:tav>
+                                        <p:tav tm="100000">
+                                          <p:val>
+                                            <p:strVal val="#ppt_y"/>
+                                          </p:val>
+                                        </p:tav>
+                                      </p:tavLst>
+                                    </p:anim>
+                                  </p:childTnLst>
+                                </p:cTn>
+                              </p:par>
+                              <p:par>
+                                <p:cTn id="35" presetID="2" presetClass="entr" presetSubtype="4" fill="hold" grpId="0" nodeType="withEffect">
+                                  <p:stCondLst>
+                                    <p:cond delay="0"/>
+                                  </p:stCondLst>
+                                  <p:childTnLst>
+                                    <p:set>
+                                      <p:cBhvr>
+                                        <p:cTn id="36" dur="1" fill="hold">
+                                          <p:stCondLst>
+                                            <p:cond delay="0"/>
+                                          </p:stCondLst>
+                                        </p:cTn>
+                                        <p:tgtEl>
+                                          <p:spTgt spid="7">
+                                            <p:txEl>
+                                              <p:pRg st="5" end="5"/>
+                                            </p:txEl>
+                                          </p:spTgt>
+                                        </p:tgtEl>
+                                        <p:attrNameLst>
+                                          <p:attrName>style.visibility</p:attrName>
+                                        </p:attrNameLst>
+                                      </p:cBhvr>
+                                      <p:to>
+                                        <p:strVal val="visible"/>
+                                      </p:to>
+                                    </p:set>
+                                    <p:anim calcmode="lin" valueType="num">
+                                      <p:cBhvr additive="base">
+                                        <p:cTn id="37" dur="500" fill="hold"/>
+                                        <p:tgtEl>
+                                          <p:spTgt spid="7">
+                                            <p:txEl>
+                                              <p:pRg st="5" end="5"/>
+                                            </p:txEl>
+                                          </p:spTgt>
+                                        </p:tgtEl>
+                                        <p:attrNameLst>
+                                          <p:attrName>ppt_x</p:attrName>
+                                        </p:attrNameLst>
+                                      </p:cBhvr>
+                                      <p:tavLst>
+                                        <p:tav tm="0">
+                                          <p:val>
+                                            <p:strVal val="#ppt_x"/>
+                                          </p:val>
+                                        </p:tav>
+                                        <p:tav tm="100000">
+                                          <p:val>
+                                            <p:strVal val="#ppt_x"/>
+                                          </p:val>
+                                        </p:tav>
+                                      </p:tavLst>
+                                    </p:anim>
+                                    <p:anim calcmode="lin" valueType="num">
+                                      <p:cBhvr additive="base">
+                                        <p:cTn id="38" dur="500" fill="hold"/>
+                                        <p:tgtEl>
+                                          <p:spTgt spid="7">
+                                            <p:txEl>
+                                              <p:pRg st="5" end="5"/>
+                                            </p:txEl>
+                                          </p:spTgt>
+                                        </p:tgtEl>
+                                        <p:attrNameLst>
+                                          <p:attrName>ppt_y</p:attrName>
+                                        </p:attrNameLst>
+                                      </p:cBhvr>
+                                      <p:tavLst>
+                                        <p:tav tm="0">
+                                          <p:val>
+                                            <p:strVal val="1+#ppt_h/2"/>
+                                          </p:val>
+                                        </p:tav>
+                                        <p:tav tm="100000">
+                                          <p:val>
+                                            <p:strVal val="#ppt_y"/>
+                                          </p:val>
+                                        </p:tav>
+                                      </p:tavLst>
+                                    </p:anim>
+                                  </p:childTnLst>
+                                </p:cTn>
+                              </p:par>
+                              <p:par>
+                                <p:cTn id="39" presetID="2" presetClass="entr" presetSubtype="4" fill="hold" grpId="0" nodeType="withEffect">
+                                  <p:stCondLst>
+                                    <p:cond delay="0"/>
+                                  </p:stCondLst>
+                                  <p:childTnLst>
+                                    <p:set>
+                                      <p:cBhvr>
+                                        <p:cTn id="40" dur="1" fill="hold">
+                                          <p:stCondLst>
+                                            <p:cond delay="0"/>
+                                          </p:stCondLst>
+                                        </p:cTn>
+                                        <p:tgtEl>
+                                          <p:spTgt spid="9">
+                                            <p:txEl>
+                                              <p:pRg st="1" end="1"/>
+                                            </p:txEl>
+                                          </p:spTgt>
+                                        </p:tgtEl>
+                                        <p:attrNameLst>
+                                          <p:attrName>style.visibility</p:attrName>
+                                        </p:attrNameLst>
+                                      </p:cBhvr>
+                                      <p:to>
+                                        <p:strVal val="visible"/>
+                                      </p:to>
+                                    </p:set>
+                                    <p:anim calcmode="lin" valueType="num">
+                                      <p:cBhvr additive="base">
+                                        <p:cTn id="41" dur="500" fill="hold"/>
+                                        <p:tgtEl>
+                                          <p:spTgt spid="9">
+                                            <p:txEl>
+                                              <p:pRg st="1" end="1"/>
+                                            </p:txEl>
+                                          </p:spTgt>
+                                        </p:tgtEl>
+                                        <p:attrNameLst>
+                                          <p:attrName>ppt_x</p:attrName>
+                                        </p:attrNameLst>
+                                      </p:cBhvr>
+                                      <p:tavLst>
+                                        <p:tav tm="0">
+                                          <p:val>
+                                            <p:strVal val="#ppt_x"/>
+                                          </p:val>
+                                        </p:tav>
+                                        <p:tav tm="100000">
+                                          <p:val>
+                                            <p:strVal val="#ppt_x"/>
+                                          </p:val>
+                                        </p:tav>
+                                      </p:tavLst>
+                                    </p:anim>
+                                    <p:anim calcmode="lin" valueType="num">
+                                      <p:cBhvr additive="base">
+                                        <p:cTn id="42" dur="500" fill="hold"/>
+                                        <p:tgtEl>
+                                          <p:spTgt spid="9">
+                                            <p:txEl>
+                                              <p:pRg st="1" end="1"/>
+                                            </p:txEl>
+                                          </p:spTgt>
+                                        </p:tgtEl>
+                                        <p:attrNameLst>
+                                          <p:attrName>ppt_y</p:attrName>
+                                        </p:attrNameLst>
+                                      </p:cBhvr>
+                                      <p:tavLst>
+                                        <p:tav tm="0">
+                                          <p:val>
+                                            <p:strVal val="1+#ppt_h/2"/>
+                                          </p:val>
+                                        </p:tav>
+                                        <p:tav tm="100000">
+                                          <p:val>
+                                            <p:strVal val="#ppt_y"/>
+                                          </p:val>
+                                        </p:tav>
+                                      </p:tavLst>
+                                    </p:anim>
+                                  </p:childTnLst>
+                                </p:cTn>
+                              </p:par>
+                              <p:par>
+                                <p:cTn id="43" presetID="2" presetClass="entr" presetSubtype="4" fill="hold" grpId="0" nodeType="withEffect">
+                                  <p:stCondLst>
+                                    <p:cond delay="0"/>
+                                  </p:stCondLst>
+                                  <p:childTnLst>
+                                    <p:set>
+                                      <p:cBhvr>
+                                        <p:cTn id="44" dur="1" fill="hold">
+                                          <p:stCondLst>
+                                            <p:cond delay="0"/>
+                                          </p:stCondLst>
+                                        </p:cTn>
+                                        <p:tgtEl>
+                                          <p:spTgt spid="9">
+                                            <p:txEl>
+                                              <p:pRg st="2" end="2"/>
+                                            </p:txEl>
+                                          </p:spTgt>
+                                        </p:tgtEl>
+                                        <p:attrNameLst>
+                                          <p:attrName>style.visibility</p:attrName>
+                                        </p:attrNameLst>
+                                      </p:cBhvr>
+                                      <p:to>
+                                        <p:strVal val="visible"/>
+                                      </p:to>
+                                    </p:set>
+                                    <p:anim calcmode="lin" valueType="num">
+                                      <p:cBhvr additive="base">
+                                        <p:cTn id="45" dur="500" fill="hold"/>
+                                        <p:tgtEl>
+                                          <p:spTgt spid="9">
+                                            <p:txEl>
+                                              <p:pRg st="2" end="2"/>
+                                            </p:txEl>
+                                          </p:spTgt>
+                                        </p:tgtEl>
+                                        <p:attrNameLst>
+                                          <p:attrName>ppt_x</p:attrName>
+                                        </p:attrNameLst>
+                                      </p:cBhvr>
+                                      <p:tavLst>
+                                        <p:tav tm="0">
+                                          <p:val>
+                                            <p:strVal val="#ppt_x"/>
+                                          </p:val>
+                                        </p:tav>
+                                        <p:tav tm="100000">
+                                          <p:val>
+                                            <p:strVal val="#ppt_x"/>
+                                          </p:val>
+                                        </p:tav>
+                                      </p:tavLst>
+                                    </p:anim>
+                                    <p:anim calcmode="lin" valueType="num">
+                                      <p:cBhvr additive="base">
+                                        <p:cTn id="46" dur="500" fill="hold"/>
+                                        <p:tgtEl>
+                                          <p:spTgt spid="9">
+                                            <p:txEl>
+                                              <p:pRg st="2" end="2"/>
+                                            </p:txEl>
+                                          </p:spTgt>
+                                        </p:tgtEl>
+                                        <p:attrNameLst>
+                                          <p:attrName>ppt_y</p:attrName>
+                                        </p:attrNameLst>
+                                      </p:cBhvr>
+                                      <p:tavLst>
+                                        <p:tav tm="0">
+                                          <p:val>
+                                            <p:strVal val="1+#ppt_h/2"/>
+                                          </p:val>
+                                        </p:tav>
+                                        <p:tav tm="100000">
+                                          <p:val>
+                                            <p:strVal val="#ppt_y"/>
+                                          </p:val>
+                                        </p:tav>
+                                      </p:tavLst>
+                                    </p:anim>
+                                  </p:childTnLst>
+                                </p:cTn>
+                              </p:par>
+                            </p:childTnLst>
+                          </p:cTn>
+                        </p:par>
+                      </p:childTnLst>
+                    </p:cTn>
+                  </p:par>
+                  <p:par>
+                    <p:cTn id="47" fill="hold">
+                      <p:stCondLst>
+                        <p:cond delay="indefinite"/>
+                      </p:stCondLst>
+                      <p:childTnLst>
+                        <p:par>
+                          <p:cTn id="48" fill="hold">
+                            <p:stCondLst>
+                              <p:cond delay="0"/>
+                            </p:stCondLst>
+                            <p:childTnLst>
+                              <p:par>
+                                <p:cTn id="49" presetID="2" presetClass="entr" presetSubtype="4" fill="hold" grpId="0" nodeType="clickEffect">
+                                  <p:stCondLst>
+                                    <p:cond delay="0"/>
+                                  </p:stCondLst>
+                                  <p:childTnLst>
+                                    <p:set>
+                                      <p:cBhvr>
+                                        <p:cTn id="50" dur="1" fill="hold">
+                                          <p:stCondLst>
+                                            <p:cond delay="0"/>
+                                          </p:stCondLst>
+                                        </p:cTn>
+                                        <p:tgtEl>
+                                          <p:spTgt spid="9">
+                                            <p:txEl>
+                                              <p:pRg st="4" end="4"/>
+                                            </p:txEl>
+                                          </p:spTgt>
+                                        </p:tgtEl>
+                                        <p:attrNameLst>
+                                          <p:attrName>style.visibility</p:attrName>
+                                        </p:attrNameLst>
+                                      </p:cBhvr>
+                                      <p:to>
+                                        <p:strVal val="visible"/>
+                                      </p:to>
+                                    </p:set>
+                                    <p:anim calcmode="lin" valueType="num">
+                                      <p:cBhvr additive="base">
+                                        <p:cTn id="51" dur="500" fill="hold"/>
+                                        <p:tgtEl>
+                                          <p:spTgt spid="9">
+                                            <p:txEl>
+                                              <p:pRg st="4" end="4"/>
+                                            </p:txEl>
+                                          </p:spTgt>
+                                        </p:tgtEl>
+                                        <p:attrNameLst>
+                                          <p:attrName>ppt_x</p:attrName>
+                                        </p:attrNameLst>
+                                      </p:cBhvr>
+                                      <p:tavLst>
+                                        <p:tav tm="0">
+                                          <p:val>
+                                            <p:strVal val="#ppt_x"/>
+                                          </p:val>
+                                        </p:tav>
+                                        <p:tav tm="100000">
+                                          <p:val>
+                                            <p:strVal val="#ppt_x"/>
+                                          </p:val>
+                                        </p:tav>
+                                      </p:tavLst>
+                                    </p:anim>
+                                    <p:anim calcmode="lin" valueType="num">
+                                      <p:cBhvr additive="base">
+                                        <p:cTn id="52" dur="500" fill="hold"/>
+                                        <p:tgtEl>
+                                          <p:spTgt spid="9">
+                                            <p:txEl>
+                                              <p:pRg st="4" end="4"/>
+                                            </p:txEl>
+                                          </p:spTgt>
+                                        </p:tgtEl>
+                                        <p:attrNameLst>
+                                          <p:attrName>ppt_y</p:attrName>
+                                        </p:attrNameLst>
+                                      </p:cBhvr>
+                                      <p:tavLst>
+                                        <p:tav tm="0">
+                                          <p:val>
+                                            <p:strVal val="1+#ppt_h/2"/>
+                                          </p:val>
+                                        </p:tav>
+                                        <p:tav tm="100000">
+                                          <p:val>
+                                            <p:strVal val="#ppt_y"/>
+                                          </p:val>
+                                        </p:tav>
+                                      </p:tavLst>
+                                    </p:anim>
+                                  </p:childTnLst>
+                                </p:cTn>
+                              </p:par>
+                              <p:par>
+                                <p:cTn id="53" presetID="2" presetClass="entr" presetSubtype="4" fill="hold" grpId="0" nodeType="withEffect">
+                                  <p:stCondLst>
+                                    <p:cond delay="0"/>
+                                  </p:stCondLst>
+                                  <p:childTnLst>
+                                    <p:set>
+                                      <p:cBhvr>
+                                        <p:cTn id="54" dur="1" fill="hold">
+                                          <p:stCondLst>
+                                            <p:cond delay="0"/>
+                                          </p:stCondLst>
+                                        </p:cTn>
+                                        <p:tgtEl>
+                                          <p:spTgt spid="9">
+                                            <p:txEl>
+                                              <p:pRg st="5" end="5"/>
+                                            </p:txEl>
+                                          </p:spTgt>
+                                        </p:tgtEl>
+                                        <p:attrNameLst>
+                                          <p:attrName>style.visibility</p:attrName>
+                                        </p:attrNameLst>
+                                      </p:cBhvr>
+                                      <p:to>
+                                        <p:strVal val="visible"/>
+                                      </p:to>
+                                    </p:set>
+                                    <p:anim calcmode="lin" valueType="num">
+                                      <p:cBhvr additive="base">
+                                        <p:cTn id="55" dur="500" fill="hold"/>
+                                        <p:tgtEl>
+                                          <p:spTgt spid="9">
+                                            <p:txEl>
+                                              <p:pRg st="5" end="5"/>
+                                            </p:txEl>
+                                          </p:spTgt>
+                                        </p:tgtEl>
+                                        <p:attrNameLst>
+                                          <p:attrName>ppt_x</p:attrName>
+                                        </p:attrNameLst>
+                                      </p:cBhvr>
+                                      <p:tavLst>
+                                        <p:tav tm="0">
+                                          <p:val>
+                                            <p:strVal val="#ppt_x"/>
+                                          </p:val>
+                                        </p:tav>
+                                        <p:tav tm="100000">
+                                          <p:val>
+                                            <p:strVal val="#ppt_x"/>
+                                          </p:val>
+                                        </p:tav>
+                                      </p:tavLst>
+                                    </p:anim>
+                                    <p:anim calcmode="lin" valueType="num">
+                                      <p:cBhvr additive="base">
+                                        <p:cTn id="56" dur="500" fill="hold"/>
+                                        <p:tgtEl>
+                                          <p:spTgt spid="9">
+                                            <p:txEl>
+                                              <p:pRg st="5" end="5"/>
+                                            </p:txEl>
+                                          </p:spTgt>
+                                        </p:tgtEl>
+                                        <p:attrNameLst>
+                                          <p:attrName>ppt_y</p:attrName>
+                                        </p:attrNameLst>
+                                      </p:cBhvr>
+                                      <p:tavLst>
+                                        <p:tav tm="0">
+                                          <p:val>
+                                            <p:strVal val="1+#ppt_h/2"/>
+                                          </p:val>
+                                        </p:tav>
+                                        <p:tav tm="100000">
+                                          <p:val>
+                                            <p:strVal val="#ppt_y"/>
+                                          </p:val>
+                                        </p:tav>
+                                      </p:tavLst>
+                                    </p:anim>
+                                  </p:childTnLst>
+                                </p:cTn>
+                              </p:par>
+                            </p:childTnLst>
+                          </p:cTn>
+                        </p:par>
+                      </p:childTnLst>
+                    </p:cTn>
+                  </p:par>
+                </p:childTnLst>
+              </p:cTn>
+              <p:prevCondLst>
+                <p:cond evt="onPrev" delay="0">
+                  <p:tgtEl>
+                    <p:sldTgt/>
+                  </p:tgtEl>
+                </p:cond>
+              </p:prevCondLst>
+              <p:nextCondLst>
+                <p:cond evt="onNext" delay="0">
+                  <p:tgtEl>
+                    <p:sldTgt/>
+                  </p:tgtEl>
+                </p:cond>
+              </p:nextCondLst>
+            </p:seq>
+          </p:childTnLst>
+        </p:cTn>
       </p:par>
     </p:tnLst>
+    <p:bldLst>
+      <p:bldP spid="7" grpId="0" build="p"/>
+      <p:bldP spid="8" grpId="0" build="p"/>
+      <p:bldP spid="9" grpId="0" build="p"/>
+    </p:bldLst>
   </p:timing>
 </p:sld>
 </file>
@@ -7336,9 +8553,252 @@
   <p:timing>
     <p:tnLst>
       <p:par>
-        <p:cTn id="1" dur="indefinite" restart="never" nodeType="tmRoot"/>
+        <p:cTn id="1" dur="indefinite" restart="never" nodeType="tmRoot">
+          <p:childTnLst>
+            <p:seq concurrent="1" nextAc="seek">
+              <p:cTn id="2" dur="indefinite" nodeType="mainSeq">
+                <p:childTnLst>
+                  <p:par>
+                    <p:cTn id="3" fill="hold">
+                      <p:stCondLst>
+                        <p:cond delay="indefinite"/>
+                      </p:stCondLst>
+                      <p:childTnLst>
+                        <p:par>
+                          <p:cTn id="4" fill="hold">
+                            <p:stCondLst>
+                              <p:cond delay="0"/>
+                            </p:stCondLst>
+                            <p:childTnLst>
+                              <p:par>
+                                <p:cTn id="5" presetID="10" presetClass="entr" presetSubtype="0" fill="hold" grpId="0" nodeType="clickEffect">
+                                  <p:stCondLst>
+                                    <p:cond delay="0"/>
+                                  </p:stCondLst>
+                                  <p:childTnLst>
+                                    <p:set>
+                                      <p:cBhvr>
+                                        <p:cTn id="6" dur="1" fill="hold">
+                                          <p:stCondLst>
+                                            <p:cond delay="0"/>
+                                          </p:stCondLst>
+                                        </p:cTn>
+                                        <p:tgtEl>
+                                          <p:spTgt spid="2"/>
+                                        </p:tgtEl>
+                                        <p:attrNameLst>
+                                          <p:attrName>style.visibility</p:attrName>
+                                        </p:attrNameLst>
+                                      </p:cBhvr>
+                                      <p:to>
+                                        <p:strVal val="visible"/>
+                                      </p:to>
+                                    </p:set>
+                                    <p:animEffect transition="in" filter="fade">
+                                      <p:cBhvr>
+                                        <p:cTn id="7" dur="2000"/>
+                                        <p:tgtEl>
+                                          <p:spTgt spid="2"/>
+                                        </p:tgtEl>
+                                      </p:cBhvr>
+                                    </p:animEffect>
+                                  </p:childTnLst>
+                                </p:cTn>
+                              </p:par>
+                            </p:childTnLst>
+                          </p:cTn>
+                        </p:par>
+                      </p:childTnLst>
+                    </p:cTn>
+                  </p:par>
+                  <p:par>
+                    <p:cTn id="8" fill="hold">
+                      <p:stCondLst>
+                        <p:cond delay="indefinite"/>
+                      </p:stCondLst>
+                      <p:childTnLst>
+                        <p:par>
+                          <p:cTn id="9" fill="hold">
+                            <p:stCondLst>
+                              <p:cond delay="0"/>
+                            </p:stCondLst>
+                            <p:childTnLst>
+                              <p:par>
+                                <p:cTn id="10" presetID="2" presetClass="entr" presetSubtype="4" fill="hold" nodeType="clickEffect">
+                                  <p:stCondLst>
+                                    <p:cond delay="0"/>
+                                  </p:stCondLst>
+                                  <p:childTnLst>
+                                    <p:set>
+                                      <p:cBhvr>
+                                        <p:cTn id="11" dur="1" fill="hold">
+                                          <p:stCondLst>
+                                            <p:cond delay="0"/>
+                                          </p:stCondLst>
+                                        </p:cTn>
+                                        <p:tgtEl>
+                                          <p:spTgt spid="1026"/>
+                                        </p:tgtEl>
+                                        <p:attrNameLst>
+                                          <p:attrName>style.visibility</p:attrName>
+                                        </p:attrNameLst>
+                                      </p:cBhvr>
+                                      <p:to>
+                                        <p:strVal val="visible"/>
+                                      </p:to>
+                                    </p:set>
+                                    <p:anim calcmode="lin" valueType="num">
+                                      <p:cBhvr additive="base">
+                                        <p:cTn id="12" dur="500" fill="hold"/>
+                                        <p:tgtEl>
+                                          <p:spTgt spid="1026"/>
+                                        </p:tgtEl>
+                                        <p:attrNameLst>
+                                          <p:attrName>ppt_x</p:attrName>
+                                        </p:attrNameLst>
+                                      </p:cBhvr>
+                                      <p:tavLst>
+                                        <p:tav tm="0">
+                                          <p:val>
+                                            <p:strVal val="#ppt_x"/>
+                                          </p:val>
+                                        </p:tav>
+                                        <p:tav tm="100000">
+                                          <p:val>
+                                            <p:strVal val="#ppt_x"/>
+                                          </p:val>
+                                        </p:tav>
+                                      </p:tavLst>
+                                    </p:anim>
+                                    <p:anim calcmode="lin" valueType="num">
+                                      <p:cBhvr additive="base">
+                                        <p:cTn id="13" dur="500" fill="hold"/>
+                                        <p:tgtEl>
+                                          <p:spTgt spid="1026"/>
+                                        </p:tgtEl>
+                                        <p:attrNameLst>
+                                          <p:attrName>ppt_y</p:attrName>
+                                        </p:attrNameLst>
+                                      </p:cBhvr>
+                                      <p:tavLst>
+                                        <p:tav tm="0">
+                                          <p:val>
+                                            <p:strVal val="1+#ppt_h/2"/>
+                                          </p:val>
+                                        </p:tav>
+                                        <p:tav tm="100000">
+                                          <p:val>
+                                            <p:strVal val="#ppt_y"/>
+                                          </p:val>
+                                        </p:tav>
+                                      </p:tavLst>
+                                    </p:anim>
+                                  </p:childTnLst>
+                                </p:cTn>
+                              </p:par>
+                              <p:par>
+                                <p:cTn id="14" presetID="2" presetClass="entr" presetSubtype="4" fill="hold" nodeType="withEffect">
+                                  <p:stCondLst>
+                                    <p:cond delay="0"/>
+                                  </p:stCondLst>
+                                  <p:childTnLst>
+                                    <p:set>
+                                      <p:cBhvr>
+                                        <p:cTn id="15" dur="1" fill="hold">
+                                          <p:stCondLst>
+                                            <p:cond delay="0"/>
+                                          </p:stCondLst>
+                                        </p:cTn>
+                                        <p:tgtEl>
+                                          <p:spTgt spid="9"/>
+                                        </p:tgtEl>
+                                        <p:attrNameLst>
+                                          <p:attrName>style.visibility</p:attrName>
+                                        </p:attrNameLst>
+                                      </p:cBhvr>
+                                      <p:to>
+                                        <p:strVal val="visible"/>
+                                      </p:to>
+                                    </p:set>
+                                    <p:anim calcmode="lin" valueType="num">
+                                      <p:cBhvr additive="base">
+                                        <p:cTn id="16" dur="500" fill="hold"/>
+                                        <p:tgtEl>
+                                          <p:spTgt spid="9"/>
+                                        </p:tgtEl>
+                                        <p:attrNameLst>
+                                          <p:attrName>ppt_x</p:attrName>
+                                        </p:attrNameLst>
+                                      </p:cBhvr>
+                                      <p:tavLst>
+                                        <p:tav tm="0">
+                                          <p:val>
+                                            <p:strVal val="#ppt_x"/>
+                                          </p:val>
+                                        </p:tav>
+                                        <p:tav tm="100000">
+                                          <p:val>
+                                            <p:strVal val="#ppt_x"/>
+                                          </p:val>
+                                        </p:tav>
+                                      </p:tavLst>
+                                    </p:anim>
+                                    <p:anim calcmode="lin" valueType="num">
+                                      <p:cBhvr additive="base">
+                                        <p:cTn id="17" dur="500" fill="hold"/>
+                                        <p:tgtEl>
+                                          <p:spTgt spid="9"/>
+                                        </p:tgtEl>
+                                        <p:attrNameLst>
+                                          <p:attrName>ppt_y</p:attrName>
+                                        </p:attrNameLst>
+                                      </p:cBhvr>
+                                      <p:tavLst>
+                                        <p:tav tm="0">
+                                          <p:val>
+                                            <p:strVal val="1+#ppt_h/2"/>
+                                          </p:val>
+                                        </p:tav>
+                                        <p:tav tm="100000">
+                                          <p:val>
+                                            <p:strVal val="#ppt_y"/>
+                                          </p:val>
+                                        </p:tav>
+                                      </p:tavLst>
+                                    </p:anim>
+                                  </p:childTnLst>
+                                </p:cTn>
+                              </p:par>
+                            </p:childTnLst>
+                          </p:cTn>
+                        </p:par>
+                      </p:childTnLst>
+                    </p:cTn>
+                  </p:par>
+                </p:childTnLst>
+              </p:cTn>
+              <p:prevCondLst>
+                <p:cond evt="onPrev" delay="0">
+                  <p:tgtEl>
+                    <p:sldTgt/>
+                  </p:tgtEl>
+                </p:cond>
+              </p:prevCondLst>
+              <p:nextCondLst>
+                <p:cond evt="onNext" delay="0">
+                  <p:tgtEl>
+                    <p:sldTgt/>
+                  </p:tgtEl>
+                </p:cond>
+              </p:nextCondLst>
+            </p:seq>
+          </p:childTnLst>
+        </p:cTn>
       </p:par>
     </p:tnLst>
+    <p:bldLst>
+      <p:bldP spid="2" grpId="0"/>
+    </p:bldLst>
   </p:timing>
 </p:sld>
 </file>
@@ -7423,7 +8883,7 @@
         </p:blipFill>
         <p:spPr>
           <a:xfrm>
-            <a:off x="3692308" y="1392194"/>
+            <a:off x="3705371" y="739051"/>
             <a:ext cx="4477010" cy="5223179"/>
           </a:xfrm>
           <a:prstGeom prst="rect">
@@ -7466,7 +8926,83 @@
   <p:timing>
     <p:tnLst>
       <p:par>
-        <p:cTn id="1" dur="indefinite" restart="never" nodeType="tmRoot"/>
+        <p:cTn id="1" dur="indefinite" restart="never" nodeType="tmRoot">
+          <p:childTnLst>
+            <p:seq concurrent="1" nextAc="seek">
+              <p:cTn id="2" dur="indefinite" nodeType="mainSeq">
+                <p:childTnLst>
+                  <p:par>
+                    <p:cTn id="3" fill="hold">
+                      <p:stCondLst>
+                        <p:cond delay="indefinite"/>
+                      </p:stCondLst>
+                      <p:childTnLst>
+                        <p:par>
+                          <p:cTn id="4" fill="hold">
+                            <p:stCondLst>
+                              <p:cond delay="0"/>
+                            </p:stCondLst>
+                            <p:childTnLst>
+                              <p:par>
+                                <p:cTn id="5" presetID="22" presetClass="entr" presetSubtype="4" fill="hold" nodeType="clickEffect">
+                                  <p:stCondLst>
+                                    <p:cond delay="0"/>
+                                  </p:stCondLst>
+                                  <p:childTnLst>
+                                    <p:set>
+                                      <p:cBhvr>
+                                        <p:cTn id="6" dur="1" fill="hold">
+                                          <p:stCondLst>
+                                            <p:cond delay="0"/>
+                                          </p:stCondLst>
+                                        </p:cTn>
+                                        <p:tgtEl>
+                                          <p:spTgt spid="3"/>
+                                        </p:tgtEl>
+                                        <p:attrNameLst>
+                                          <p:attrName>style.visibility</p:attrName>
+                                        </p:attrNameLst>
+                                      </p:cBhvr>
+                                      <p:to>
+                                        <p:strVal val="visible"/>
+                                      </p:to>
+                                    </p:set>
+                                    <p:animEffect transition="in" filter="wipe(down)">
+                                      <p:cBhvr>
+                                        <p:cTn id="7" dur="500"/>
+                                        <p:tgtEl>
+                                          <p:spTgt spid="3"/>
+                                        </p:tgtEl>
+                                      </p:cBhvr>
+                                    </p:animEffect>
+                                  </p:childTnLst>
+                                </p:cTn>
+                              </p:par>
+                            </p:childTnLst>
+                          </p:cTn>
+                        </p:par>
+                      </p:childTnLst>
+                    </p:cTn>
+                  </p:par>
+                </p:childTnLst>
+              </p:cTn>
+              <p:prevCondLst>
+                <p:cond evt="onPrev" delay="0">
+                  <p:tgtEl>
+                    <p:sldTgt/>
+                  </p:tgtEl>
+                </p:cond>
+              </p:prevCondLst>
+              <p:nextCondLst>
+                <p:cond evt="onNext" delay="0">
+                  <p:tgtEl>
+                    <p:sldTgt/>
+                  </p:tgtEl>
+                </p:cond>
+              </p:nextCondLst>
+            </p:seq>
+          </p:childTnLst>
+        </p:cTn>
       </p:par>
     </p:tnLst>
   </p:timing>

</xml_diff>